<commit_message>
Update seconds in a trial
</commit_message>
<xml_diff>
--- a/trial_sequence.pptx
+++ b/trial_sequence.pptx
@@ -117,7 +117,7 @@
             <a:srgbClr val="A4A3A4"/>
           </p15:clr>
         </p15:guide>
-        <p15:guide id="3" orient="horz" pos="2659" userDrawn="1">
+        <p15:guide id="3" orient="horz" pos="3475" userDrawn="1">
           <p15:clr>
             <a:srgbClr val="A4A3A4"/>
           </p15:clr>
@@ -277,7 +277,7 @@
           <a:p>
             <a:fld id="{1E886E89-1E01-384C-AAB4-D2E5DF7DAE03}" type="datetimeFigureOut">
               <a:rPr kumimoji="1" lang="ko-Kore-KR" altLang="en-US" smtClean="0"/>
-              <a:t>2021. 5. 19.</a:t>
+              <a:t>2021. 5. 21.</a:t>
             </a:fld>
             <a:endParaRPr kumimoji="1" lang="ko-Kore-KR" altLang="en-US"/>
           </a:p>
@@ -477,7 +477,7 @@
           <a:p>
             <a:fld id="{1E886E89-1E01-384C-AAB4-D2E5DF7DAE03}" type="datetimeFigureOut">
               <a:rPr kumimoji="1" lang="ko-Kore-KR" altLang="en-US" smtClean="0"/>
-              <a:t>2021. 5. 19.</a:t>
+              <a:t>2021. 5. 21.</a:t>
             </a:fld>
             <a:endParaRPr kumimoji="1" lang="ko-Kore-KR" altLang="en-US"/>
           </a:p>
@@ -687,7 +687,7 @@
           <a:p>
             <a:fld id="{1E886E89-1E01-384C-AAB4-D2E5DF7DAE03}" type="datetimeFigureOut">
               <a:rPr kumimoji="1" lang="ko-Kore-KR" altLang="en-US" smtClean="0"/>
-              <a:t>2021. 5. 19.</a:t>
+              <a:t>2021. 5. 21.</a:t>
             </a:fld>
             <a:endParaRPr kumimoji="1" lang="ko-Kore-KR" altLang="en-US"/>
           </a:p>
@@ -887,7 +887,7 @@
           <a:p>
             <a:fld id="{1E886E89-1E01-384C-AAB4-D2E5DF7DAE03}" type="datetimeFigureOut">
               <a:rPr kumimoji="1" lang="ko-Kore-KR" altLang="en-US" smtClean="0"/>
-              <a:t>2021. 5. 19.</a:t>
+              <a:t>2021. 5. 21.</a:t>
             </a:fld>
             <a:endParaRPr kumimoji="1" lang="ko-Kore-KR" altLang="en-US"/>
           </a:p>
@@ -1163,7 +1163,7 @@
           <a:p>
             <a:fld id="{1E886E89-1E01-384C-AAB4-D2E5DF7DAE03}" type="datetimeFigureOut">
               <a:rPr kumimoji="1" lang="ko-Kore-KR" altLang="en-US" smtClean="0"/>
-              <a:t>2021. 5. 19.</a:t>
+              <a:t>2021. 5. 21.</a:t>
             </a:fld>
             <a:endParaRPr kumimoji="1" lang="ko-Kore-KR" altLang="en-US"/>
           </a:p>
@@ -1431,7 +1431,7 @@
           <a:p>
             <a:fld id="{1E886E89-1E01-384C-AAB4-D2E5DF7DAE03}" type="datetimeFigureOut">
               <a:rPr kumimoji="1" lang="ko-Kore-KR" altLang="en-US" smtClean="0"/>
-              <a:t>2021. 5. 19.</a:t>
+              <a:t>2021. 5. 21.</a:t>
             </a:fld>
             <a:endParaRPr kumimoji="1" lang="ko-Kore-KR" altLang="en-US"/>
           </a:p>
@@ -1846,7 +1846,7 @@
           <a:p>
             <a:fld id="{1E886E89-1E01-384C-AAB4-D2E5DF7DAE03}" type="datetimeFigureOut">
               <a:rPr kumimoji="1" lang="ko-Kore-KR" altLang="en-US" smtClean="0"/>
-              <a:t>2021. 5. 19.</a:t>
+              <a:t>2021. 5. 21.</a:t>
             </a:fld>
             <a:endParaRPr kumimoji="1" lang="ko-Kore-KR" altLang="en-US"/>
           </a:p>
@@ -1988,7 +1988,7 @@
           <a:p>
             <a:fld id="{1E886E89-1E01-384C-AAB4-D2E5DF7DAE03}" type="datetimeFigureOut">
               <a:rPr kumimoji="1" lang="ko-Kore-KR" altLang="en-US" smtClean="0"/>
-              <a:t>2021. 5. 19.</a:t>
+              <a:t>2021. 5. 21.</a:t>
             </a:fld>
             <a:endParaRPr kumimoji="1" lang="ko-Kore-KR" altLang="en-US"/>
           </a:p>
@@ -2101,7 +2101,7 @@
           <a:p>
             <a:fld id="{1E886E89-1E01-384C-AAB4-D2E5DF7DAE03}" type="datetimeFigureOut">
               <a:rPr kumimoji="1" lang="ko-Kore-KR" altLang="en-US" smtClean="0"/>
-              <a:t>2021. 5. 19.</a:t>
+              <a:t>2021. 5. 21.</a:t>
             </a:fld>
             <a:endParaRPr kumimoji="1" lang="ko-Kore-KR" altLang="en-US"/>
           </a:p>
@@ -2414,7 +2414,7 @@
           <a:p>
             <a:fld id="{1E886E89-1E01-384C-AAB4-D2E5DF7DAE03}" type="datetimeFigureOut">
               <a:rPr kumimoji="1" lang="ko-Kore-KR" altLang="en-US" smtClean="0"/>
-              <a:t>2021. 5. 19.</a:t>
+              <a:t>2021. 5. 21.</a:t>
             </a:fld>
             <a:endParaRPr kumimoji="1" lang="ko-Kore-KR" altLang="en-US"/>
           </a:p>
@@ -2703,7 +2703,7 @@
           <a:p>
             <a:fld id="{1E886E89-1E01-384C-AAB4-D2E5DF7DAE03}" type="datetimeFigureOut">
               <a:rPr kumimoji="1" lang="ko-Kore-KR" altLang="en-US" smtClean="0"/>
-              <a:t>2021. 5. 19.</a:t>
+              <a:t>2021. 5. 21.</a:t>
             </a:fld>
             <a:endParaRPr kumimoji="1" lang="ko-Kore-KR" altLang="en-US"/>
           </a:p>
@@ -2946,7 +2946,7 @@
           <a:p>
             <a:fld id="{1E886E89-1E01-384C-AAB4-D2E5DF7DAE03}" type="datetimeFigureOut">
               <a:rPr kumimoji="1" lang="ko-Kore-KR" altLang="en-US" smtClean="0"/>
-              <a:t>2021. 5. 19.</a:t>
+              <a:t>2021. 5. 21.</a:t>
             </a:fld>
             <a:endParaRPr kumimoji="1" lang="ko-Kore-KR" altLang="en-US"/>
           </a:p>
@@ -3363,6 +3363,51 @@
           <a:chExt cx="0" cy="0"/>
         </a:xfrm>
       </p:grpSpPr>
+      <p:cxnSp>
+        <p:nvCxnSpPr>
+          <p:cNvPr id="57" name="직선 연결선[R] 56">
+            <a:extLst>
+              <a:ext uri="{FF2B5EF4-FFF2-40B4-BE49-F238E27FC236}">
+                <a16:creationId xmlns:a16="http://schemas.microsoft.com/office/drawing/2014/main" id="{FE1DD1B8-A111-9D4B-8A09-5B81E1459149}"/>
+              </a:ext>
+            </a:extLst>
+          </p:cNvPr>
+          <p:cNvCxnSpPr>
+            <a:cxnSpLocks/>
+            <a:endCxn id="36" idx="0"/>
+          </p:cNvCxnSpPr>
+          <p:nvPr/>
+        </p:nvCxnSpPr>
+        <p:spPr>
+          <a:xfrm flipH="1">
+            <a:off x="8344620" y="1899923"/>
+            <a:ext cx="310186" cy="450886"/>
+          </a:xfrm>
+          <a:prstGeom prst="line">
+            <a:avLst/>
+          </a:prstGeom>
+          <a:ln>
+            <a:solidFill>
+              <a:schemeClr val="tx1"/>
+            </a:solidFill>
+            <a:prstDash val="dash"/>
+          </a:ln>
+        </p:spPr>
+        <p:style>
+          <a:lnRef idx="1">
+            <a:schemeClr val="accent1"/>
+          </a:lnRef>
+          <a:fillRef idx="0">
+            <a:schemeClr val="accent1"/>
+          </a:fillRef>
+          <a:effectRef idx="0">
+            <a:schemeClr val="accent1"/>
+          </a:effectRef>
+          <a:fontRef idx="minor">
+            <a:schemeClr val="tx1"/>
+          </a:fontRef>
+        </p:style>
+      </p:cxnSp>
       <p:grpSp>
         <p:nvGrpSpPr>
           <p:cNvPr id="4" name="그룹 3">
@@ -3377,7 +3422,7 @@
         </p:nvGrpSpPr>
         <p:grpSpPr>
           <a:xfrm>
-            <a:off x="1651122" y="1320859"/>
+            <a:off x="1055440" y="149227"/>
             <a:ext cx="2023620" cy="3265784"/>
             <a:chOff x="3113570" y="25517034"/>
             <a:chExt cx="2023620" cy="3265784"/>
@@ -3592,7 +3637,7 @@
         </p:nvGrpSpPr>
         <p:grpSpPr>
           <a:xfrm>
-            <a:off x="2793528" y="1899972"/>
+            <a:off x="2422045" y="1190981"/>
             <a:ext cx="2023620" cy="3041196"/>
             <a:chOff x="7467629" y="26132587"/>
             <a:chExt cx="2023620" cy="3041196"/>
@@ -4024,7 +4069,7 @@
         </p:nvGrpSpPr>
         <p:grpSpPr>
           <a:xfrm>
-            <a:off x="3935934" y="1916832"/>
+            <a:off x="3788650" y="1532725"/>
             <a:ext cx="2023620" cy="2642977"/>
             <a:chOff x="3113570" y="26139841"/>
             <a:chExt cx="2023620" cy="2642977"/>
@@ -4220,7 +4265,7 @@
         </p:nvGrpSpPr>
         <p:grpSpPr>
           <a:xfrm>
-            <a:off x="5078340" y="1339728"/>
+            <a:off x="5155255" y="1291382"/>
             <a:ext cx="2023620" cy="3241400"/>
             <a:chOff x="6192940" y="25532274"/>
             <a:chExt cx="2023620" cy="3241400"/>
@@ -4394,7 +4439,7 @@
                 <a:rPr kumimoji="1" lang="en-US" altLang="ko-KR" sz="2000" b="1" dirty="0">
                   <a:latin typeface="PT Sans" panose="020B0503020203020204" pitchFamily="34" charset="0"/>
                 </a:rPr>
-                <a:t>1s</a:t>
+                <a:t>4s</a:t>
               </a:r>
             </a:p>
             <a:p>
@@ -4403,7 +4448,7 @@
                 <a:rPr kumimoji="1" lang="en-US" altLang="ko-KR" sz="2000" b="1" dirty="0">
                   <a:latin typeface="PT Sans" panose="020B0503020203020204" pitchFamily="34" charset="0"/>
                 </a:rPr>
-                <a:t>2s</a:t>
+                <a:t>5s</a:t>
               </a:r>
             </a:p>
             <a:p>
@@ -4412,7 +4457,7 @@
                 <a:rPr kumimoji="1" lang="en-US" altLang="ko-KR" sz="2000" b="1" dirty="0">
                   <a:latin typeface="PT Sans" panose="020B0503020203020204" pitchFamily="34" charset="0"/>
                 </a:rPr>
-                <a:t>3s</a:t>
+                <a:t>6s</a:t>
               </a:r>
               <a:endParaRPr kumimoji="1" lang="ko-KR" altLang="en-US" sz="2000" b="1" dirty="0">
                 <a:latin typeface="PT Sans" panose="020B0503020203020204" pitchFamily="34" charset="0"/>
@@ -4435,7 +4480,7 @@
         </p:nvGrpSpPr>
         <p:grpSpPr>
           <a:xfrm>
-            <a:off x="6220746" y="1955281"/>
+            <a:off x="6521860" y="2350809"/>
             <a:ext cx="2042532" cy="2625847"/>
             <a:chOff x="4901376" y="26147827"/>
             <a:chExt cx="2042532" cy="2625847"/>
@@ -4632,7 +4677,7 @@
         </p:nvGrpSpPr>
         <p:grpSpPr>
           <a:xfrm>
-            <a:off x="7382064" y="1916832"/>
+            <a:off x="7907377" y="2779846"/>
             <a:ext cx="2023620" cy="3025956"/>
             <a:chOff x="7467629" y="26147827"/>
             <a:chExt cx="2023620" cy="3025956"/>
@@ -5064,7 +5109,7 @@
         </p:nvGrpSpPr>
         <p:grpSpPr>
           <a:xfrm>
-            <a:off x="8524470" y="1930897"/>
+            <a:off x="9273981" y="3214691"/>
             <a:ext cx="2023620" cy="2650231"/>
             <a:chOff x="8742317" y="26132587"/>
             <a:chExt cx="2023620" cy="2650231"/>
@@ -5261,8 +5306,8 @@
         </p:nvSpPr>
         <p:spPr>
           <a:xfrm>
-            <a:off x="4946777" y="5333606"/>
-            <a:ext cx="2032351" cy="369332"/>
+            <a:off x="4554296" y="623135"/>
+            <a:ext cx="3083408" cy="523220"/>
           </a:xfrm>
           <a:prstGeom prst="rect">
             <a:avLst/>
@@ -5276,14 +5321,408 @@
           <a:lstStyle/>
           <a:p>
             <a:r>
-              <a:rPr kumimoji="1" lang="en-US" altLang="ko-Kore-KR" b="1" dirty="0">
+              <a:rPr kumimoji="1" lang="en-US" altLang="ko-Kore-KR" sz="2800" b="1" u="sng" dirty="0">
                 <a:latin typeface="PT Sans" panose="020B0503020203020204" pitchFamily="34" charset="0"/>
               </a:rPr>
-              <a:t>Total duration: 27s</a:t>
-            </a:r>
-            <a:endParaRPr kumimoji="1" lang="ko-Kore-KR" altLang="en-US" b="1" dirty="0">
+              <a:t>Total duration: 2</a:t>
+            </a:r>
+            <a:r>
+              <a:rPr kumimoji="1" lang="en-US" altLang="ko-KR" sz="2800" b="1" u="sng" dirty="0">
+                <a:latin typeface="PT Sans" panose="020B0503020203020204" pitchFamily="34" charset="0"/>
+              </a:rPr>
+              <a:t>9</a:t>
+            </a:r>
+            <a:r>
+              <a:rPr kumimoji="1" lang="en-US" altLang="ko-Kore-KR" sz="2800" b="1" u="sng" dirty="0">
+                <a:latin typeface="PT Sans" panose="020B0503020203020204" pitchFamily="34" charset="0"/>
+              </a:rPr>
+              <a:t>s</a:t>
+            </a:r>
+            <a:endParaRPr kumimoji="1" lang="ko-Kore-KR" altLang="en-US" sz="2800" b="1" u="sng" dirty="0">
               <a:latin typeface="PT Sans" panose="020B0503020203020204" pitchFamily="34" charset="0"/>
             </a:endParaRPr>
+          </a:p>
+        </p:txBody>
+      </p:sp>
+      <p:grpSp>
+        <p:nvGrpSpPr>
+          <p:cNvPr id="42" name="그룹 41">
+            <a:extLst>
+              <a:ext uri="{FF2B5EF4-FFF2-40B4-BE49-F238E27FC236}">
+                <a16:creationId xmlns:a16="http://schemas.microsoft.com/office/drawing/2014/main" id="{AF217375-6D3C-914A-9910-C224265289CE}"/>
+              </a:ext>
+            </a:extLst>
+          </p:cNvPr>
+          <p:cNvGrpSpPr/>
+          <p:nvPr/>
+        </p:nvGrpSpPr>
+        <p:grpSpPr>
+          <a:xfrm>
+            <a:off x="8654805" y="705110"/>
+            <a:ext cx="3618507" cy="1172544"/>
+            <a:chOff x="5490796" y="5136776"/>
+            <a:chExt cx="3618507" cy="1172544"/>
+          </a:xfrm>
+        </p:grpSpPr>
+        <p:sp>
+          <p:nvSpPr>
+            <p:cNvPr id="16" name="직사각형 15">
+              <a:extLst>
+                <a:ext uri="{FF2B5EF4-FFF2-40B4-BE49-F238E27FC236}">
+                  <a16:creationId xmlns:a16="http://schemas.microsoft.com/office/drawing/2014/main" id="{EC8D991F-5582-424F-A4AA-03D82D3C8BF7}"/>
+                </a:ext>
+              </a:extLst>
+            </p:cNvPr>
+            <p:cNvSpPr/>
+            <p:nvPr/>
+          </p:nvSpPr>
+          <p:spPr>
+            <a:xfrm>
+              <a:off x="5490796" y="5136776"/>
+              <a:ext cx="3589999" cy="1172544"/>
+            </a:xfrm>
+            <a:prstGeom prst="rect">
+              <a:avLst/>
+            </a:prstGeom>
+            <a:solidFill>
+              <a:schemeClr val="bg1"/>
+            </a:solidFill>
+            <a:ln>
+              <a:solidFill>
+                <a:schemeClr val="tx1"/>
+              </a:solidFill>
+              <a:prstDash val="sysDash"/>
+            </a:ln>
+          </p:spPr>
+          <p:style>
+            <a:lnRef idx="2">
+              <a:schemeClr val="accent1">
+                <a:shade val="50000"/>
+              </a:schemeClr>
+            </a:lnRef>
+            <a:fillRef idx="1">
+              <a:schemeClr val="accent1"/>
+            </a:fillRef>
+            <a:effectRef idx="0">
+              <a:schemeClr val="accent1"/>
+            </a:effectRef>
+            <a:fontRef idx="minor">
+              <a:schemeClr val="lt1"/>
+            </a:fontRef>
+          </p:style>
+          <p:txBody>
+            <a:bodyPr rtlCol="0" anchor="ctr"/>
+            <a:lstStyle/>
+            <a:p>
+              <a:pPr algn="ctr"/>
+              <a:endParaRPr kumimoji="1" lang="ko-Kore-KR" altLang="en-US"/>
+            </a:p>
+          </p:txBody>
+        </p:sp>
+        <p:sp>
+          <p:nvSpPr>
+            <p:cNvPr id="18" name="사다리꼴[T] 17">
+              <a:extLst>
+                <a:ext uri="{FF2B5EF4-FFF2-40B4-BE49-F238E27FC236}">
+                  <a16:creationId xmlns:a16="http://schemas.microsoft.com/office/drawing/2014/main" id="{A22A6C4F-9BA4-5743-B91B-4A8C2C44D071}"/>
+                </a:ext>
+              </a:extLst>
+            </p:cNvPr>
+            <p:cNvSpPr/>
+            <p:nvPr/>
+          </p:nvSpPr>
+          <p:spPr>
+            <a:xfrm>
+              <a:off x="5689067" y="5518272"/>
+              <a:ext cx="3234334" cy="647032"/>
+            </a:xfrm>
+            <a:prstGeom prst="trapezoid">
+              <a:avLst>
+                <a:gd name="adj" fmla="val 87825"/>
+              </a:avLst>
+            </a:prstGeom>
+            <a:solidFill>
+              <a:schemeClr val="accent2"/>
+            </a:solidFill>
+            <a:ln>
+              <a:noFill/>
+            </a:ln>
+          </p:spPr>
+          <p:style>
+            <a:lnRef idx="2">
+              <a:schemeClr val="accent1">
+                <a:shade val="50000"/>
+              </a:schemeClr>
+            </a:lnRef>
+            <a:fillRef idx="1">
+              <a:schemeClr val="accent1"/>
+            </a:fillRef>
+            <a:effectRef idx="0">
+              <a:schemeClr val="accent1"/>
+            </a:effectRef>
+            <a:fontRef idx="minor">
+              <a:schemeClr val="lt1"/>
+            </a:fontRef>
+          </p:style>
+          <p:txBody>
+            <a:bodyPr rtlCol="0" anchor="ctr"/>
+            <a:lstStyle/>
+            <a:p>
+              <a:pPr algn="ctr"/>
+              <a:endParaRPr kumimoji="1" lang="ko-Kore-KR" altLang="en-US"/>
+            </a:p>
+          </p:txBody>
+        </p:sp>
+        <p:sp>
+          <p:nvSpPr>
+            <p:cNvPr id="41" name="TextBox 40">
+              <a:extLst>
+                <a:ext uri="{FF2B5EF4-FFF2-40B4-BE49-F238E27FC236}">
+                  <a16:creationId xmlns:a16="http://schemas.microsoft.com/office/drawing/2014/main" id="{622043B1-07E5-FD44-BC4E-76F97A52FADE}"/>
+                </a:ext>
+              </a:extLst>
+            </p:cNvPr>
+            <p:cNvSpPr txBox="1"/>
+            <p:nvPr/>
+          </p:nvSpPr>
+          <p:spPr>
+            <a:xfrm>
+              <a:off x="5518522" y="5193472"/>
+              <a:ext cx="625491" cy="738664"/>
+            </a:xfrm>
+            <a:prstGeom prst="rect">
+              <a:avLst/>
+            </a:prstGeom>
+            <a:noFill/>
+          </p:spPr>
+          <p:txBody>
+            <a:bodyPr wrap="none" rtlCol="0">
+              <a:spAutoFit/>
+            </a:bodyPr>
+            <a:lstStyle/>
+            <a:p>
+              <a:pPr algn="ctr"/>
+              <a:r>
+                <a:rPr kumimoji="1" lang="en-US" altLang="ko-Kore-KR" sz="1400" b="1" dirty="0">
+                  <a:latin typeface="PT Sans" panose="020B0503020203020204" pitchFamily="34" charset="0"/>
+                </a:rPr>
+                <a:t>Ramp</a:t>
+              </a:r>
+            </a:p>
+            <a:p>
+              <a:pPr algn="ctr"/>
+              <a:r>
+                <a:rPr kumimoji="1" lang="en-US" altLang="ko-Kore-KR" sz="1400" b="1" dirty="0">
+                  <a:latin typeface="PT Sans" panose="020B0503020203020204" pitchFamily="34" charset="0"/>
+                </a:rPr>
+                <a:t>Up</a:t>
+              </a:r>
+            </a:p>
+            <a:p>
+              <a:pPr algn="ctr"/>
+              <a:r>
+                <a:rPr kumimoji="1" lang="en-US" altLang="ko-Kore-KR" sz="1400" b="1" dirty="0">
+                  <a:latin typeface="PT Sans" panose="020B0503020203020204" pitchFamily="34" charset="0"/>
+                </a:rPr>
+                <a:t>(2s)</a:t>
+              </a:r>
+              <a:endParaRPr kumimoji="1" lang="ko-Kore-KR" altLang="en-US" sz="1400" b="1" dirty="0">
+                <a:latin typeface="PT Sans" panose="020B0503020203020204" pitchFamily="34" charset="0"/>
+              </a:endParaRPr>
+            </a:p>
+          </p:txBody>
+        </p:sp>
+        <p:sp>
+          <p:nvSpPr>
+            <p:cNvPr id="58" name="TextBox 57">
+              <a:extLst>
+                <a:ext uri="{FF2B5EF4-FFF2-40B4-BE49-F238E27FC236}">
+                  <a16:creationId xmlns:a16="http://schemas.microsoft.com/office/drawing/2014/main" id="{958CACE8-4CEC-534D-8964-BDFB8B4BD121}"/>
+                </a:ext>
+              </a:extLst>
+            </p:cNvPr>
+            <p:cNvSpPr txBox="1"/>
+            <p:nvPr/>
+          </p:nvSpPr>
+          <p:spPr>
+            <a:xfrm>
+              <a:off x="8483812" y="5184302"/>
+              <a:ext cx="625491" cy="738664"/>
+            </a:xfrm>
+            <a:prstGeom prst="rect">
+              <a:avLst/>
+            </a:prstGeom>
+            <a:noFill/>
+          </p:spPr>
+          <p:txBody>
+            <a:bodyPr wrap="none" rtlCol="0">
+              <a:spAutoFit/>
+            </a:bodyPr>
+            <a:lstStyle/>
+            <a:p>
+              <a:pPr algn="ctr"/>
+              <a:r>
+                <a:rPr kumimoji="1" lang="en-US" altLang="ko-Kore-KR" sz="1400" b="1" dirty="0">
+                  <a:latin typeface="PT Sans" panose="020B0503020203020204" pitchFamily="34" charset="0"/>
+                </a:rPr>
+                <a:t>Ramp</a:t>
+              </a:r>
+            </a:p>
+            <a:p>
+              <a:pPr algn="ctr"/>
+              <a:r>
+                <a:rPr kumimoji="1" lang="en-US" altLang="ko-Kore-KR" sz="1400" b="1" dirty="0">
+                  <a:latin typeface="PT Sans" panose="020B0503020203020204" pitchFamily="34" charset="0"/>
+                </a:rPr>
+                <a:t>Down</a:t>
+              </a:r>
+            </a:p>
+            <a:p>
+              <a:pPr algn="ctr"/>
+              <a:r>
+                <a:rPr kumimoji="1" lang="en-US" altLang="ko-Kore-KR" sz="1400" b="1" dirty="0">
+                  <a:latin typeface="PT Sans" panose="020B0503020203020204" pitchFamily="34" charset="0"/>
+                </a:rPr>
+                <a:t>(2s)</a:t>
+              </a:r>
+              <a:endParaRPr kumimoji="1" lang="ko-Kore-KR" altLang="en-US" sz="1400" b="1" dirty="0">
+                <a:latin typeface="PT Sans" panose="020B0503020203020204" pitchFamily="34" charset="0"/>
+              </a:endParaRPr>
+            </a:p>
+          </p:txBody>
+        </p:sp>
+        <p:sp>
+          <p:nvSpPr>
+            <p:cNvPr id="59" name="TextBox 58">
+              <a:extLst>
+                <a:ext uri="{FF2B5EF4-FFF2-40B4-BE49-F238E27FC236}">
+                  <a16:creationId xmlns:a16="http://schemas.microsoft.com/office/drawing/2014/main" id="{4DE42130-9C61-2045-907E-751A4F69C97C}"/>
+                </a:ext>
+              </a:extLst>
+            </p:cNvPr>
+            <p:cNvSpPr txBox="1"/>
+            <p:nvPr/>
+          </p:nvSpPr>
+          <p:spPr>
+            <a:xfrm>
+              <a:off x="6555894" y="5201918"/>
+              <a:ext cx="1400471" cy="307777"/>
+            </a:xfrm>
+            <a:prstGeom prst="rect">
+              <a:avLst/>
+            </a:prstGeom>
+            <a:noFill/>
+          </p:spPr>
+          <p:txBody>
+            <a:bodyPr wrap="square" rtlCol="0">
+              <a:spAutoFit/>
+            </a:bodyPr>
+            <a:lstStyle/>
+            <a:p>
+              <a:pPr algn="ctr"/>
+              <a:r>
+                <a:rPr kumimoji="1" lang="en-US" altLang="ko-Kore-KR" sz="1400" b="1" dirty="0">
+                  <a:latin typeface="PT Sans" panose="020B0503020203020204" pitchFamily="34" charset="0"/>
+                </a:rPr>
+                <a:t>Peak (4s)</a:t>
+              </a:r>
+            </a:p>
+          </p:txBody>
+        </p:sp>
+        <p:sp>
+          <p:nvSpPr>
+            <p:cNvPr id="60" name="TextBox 59">
+              <a:extLst>
+                <a:ext uri="{FF2B5EF4-FFF2-40B4-BE49-F238E27FC236}">
+                  <a16:creationId xmlns:a16="http://schemas.microsoft.com/office/drawing/2014/main" id="{8C956A54-B2EC-AC49-A12A-146B96E24074}"/>
+                </a:ext>
+              </a:extLst>
+            </p:cNvPr>
+            <p:cNvSpPr txBox="1"/>
+            <p:nvPr/>
+          </p:nvSpPr>
+          <p:spPr>
+            <a:xfrm>
+              <a:off x="6585559" y="5833882"/>
+              <a:ext cx="1400471" cy="307777"/>
+            </a:xfrm>
+            <a:prstGeom prst="rect">
+              <a:avLst/>
+            </a:prstGeom>
+            <a:solidFill>
+              <a:schemeClr val="accent2">
+                <a:lumMod val="20000"/>
+                <a:lumOff val="80000"/>
+              </a:schemeClr>
+            </a:solidFill>
+          </p:spPr>
+          <p:txBody>
+            <a:bodyPr wrap="square" rtlCol="0">
+              <a:spAutoFit/>
+            </a:bodyPr>
+            <a:lstStyle/>
+            <a:p>
+              <a:pPr algn="ctr"/>
+              <a:r>
+                <a:rPr kumimoji="1" lang="en-US" altLang="ko-Kore-KR" sz="1400" b="1" dirty="0">
+                  <a:latin typeface="PT Sans" panose="020B0503020203020204" pitchFamily="34" charset="0"/>
+                </a:rPr>
+                <a:t>Baseline: 32℃</a:t>
+              </a:r>
+            </a:p>
+          </p:txBody>
+        </p:sp>
+      </p:grpSp>
+      <p:sp>
+        <p:nvSpPr>
+          <p:cNvPr id="65" name="타원 64">
+            <a:extLst>
+              <a:ext uri="{FF2B5EF4-FFF2-40B4-BE49-F238E27FC236}">
+                <a16:creationId xmlns:a16="http://schemas.microsoft.com/office/drawing/2014/main" id="{ECC6DF7C-71D5-FD41-A32D-1629513D631D}"/>
+              </a:ext>
+            </a:extLst>
+          </p:cNvPr>
+          <p:cNvSpPr/>
+          <p:nvPr/>
+        </p:nvSpPr>
+        <p:spPr>
+          <a:xfrm>
+            <a:off x="8121411" y="2368885"/>
+            <a:ext cx="410961" cy="410961"/>
+          </a:xfrm>
+          <a:prstGeom prst="ellipse">
+            <a:avLst/>
+          </a:prstGeom>
+          <a:noFill/>
+          <a:ln>
+            <a:solidFill>
+              <a:schemeClr val="tx1"/>
+            </a:solidFill>
+            <a:prstDash val="sysDash"/>
+          </a:ln>
+        </p:spPr>
+        <p:style>
+          <a:lnRef idx="2">
+            <a:schemeClr val="accent1">
+              <a:shade val="50000"/>
+            </a:schemeClr>
+          </a:lnRef>
+          <a:fillRef idx="1">
+            <a:schemeClr val="accent1"/>
+          </a:fillRef>
+          <a:effectRef idx="0">
+            <a:schemeClr val="accent1"/>
+          </a:effectRef>
+          <a:fontRef idx="minor">
+            <a:schemeClr val="lt1"/>
+          </a:fontRef>
+        </p:style>
+        <p:txBody>
+          <a:bodyPr rtlCol="0" anchor="ctr"/>
+          <a:lstStyle/>
+          <a:p>
+            <a:pPr algn="ctr"/>
+            <a:endParaRPr kumimoji="1" lang="ko-Kore-KR" altLang="en-US"/>
           </a:p>
         </p:txBody>
       </p:sp>

</xml_diff>